<commit_message>
feat: update code and presentation
</commit_message>
<xml_diff>
--- a/Unidad_4/Presentación.pptx
+++ b/Unidad_4/Presentación.pptx
@@ -5,13 +5,14 @@
     <p:sldMasterId id="2147483648" r:id="rId4"/>
   </p:sldMasterIdLst>
   <p:notesMasterIdLst>
-    <p:notesMasterId r:id="rId9"/>
+    <p:notesMasterId r:id="rId10"/>
   </p:notesMasterIdLst>
   <p:sldIdLst>
     <p:sldId id="256" r:id="rId5"/>
     <p:sldId id="257" r:id="rId6"/>
     <p:sldId id="258" r:id="rId7"/>
     <p:sldId id="259" r:id="rId8"/>
+    <p:sldId id="260" r:id="rId9"/>
   </p:sldIdLst>
   <p:sldSz cx="12192000" cy="6858000"/>
   <p:notesSz cx="6858000" cy="9144000"/>
@@ -211,7 +212,7 @@
           <a:p>
             <a:fld id="{F29DC657-A5B9-41B4-AB57-79E3DB3481E8}" type="datetimeFigureOut">
               <a:rPr lang="en-US" smtClean="0"/>
-              <a:t>9/18/2024</a:t>
+              <a:t>9/18/24</a:t>
             </a:fld>
             <a:endParaRPr lang="en-US"/>
           </a:p>
@@ -709,7 +710,7 @@
           <a:p>
             <a:fld id="{E0B89D21-97A6-4434-B3B1-BAF5738D61F3}" type="datetimeFigureOut">
               <a:rPr lang="en-US" smtClean="0"/>
-              <a:t>9/18/2024</a:t>
+              <a:t>9/18/24</a:t>
             </a:fld>
             <a:endParaRPr lang="en-US"/>
           </a:p>
@@ -907,7 +908,7 @@
           <a:p>
             <a:fld id="{E0B89D21-97A6-4434-B3B1-BAF5738D61F3}" type="datetimeFigureOut">
               <a:rPr lang="en-US" smtClean="0"/>
-              <a:t>9/18/2024</a:t>
+              <a:t>9/18/24</a:t>
             </a:fld>
             <a:endParaRPr lang="en-US"/>
           </a:p>
@@ -1115,7 +1116,7 @@
           <a:p>
             <a:fld id="{E0B89D21-97A6-4434-B3B1-BAF5738D61F3}" type="datetimeFigureOut">
               <a:rPr lang="en-US" smtClean="0"/>
-              <a:t>9/18/2024</a:t>
+              <a:t>9/18/24</a:t>
             </a:fld>
             <a:endParaRPr lang="en-US"/>
           </a:p>
@@ -1382,7 +1383,7 @@
           <a:p>
             <a:fld id="{E0B89D21-97A6-4434-B3B1-BAF5738D61F3}" type="datetimeFigureOut">
               <a:rPr lang="en-US" smtClean="0"/>
-              <a:t>9/18/2024</a:t>
+              <a:t>9/18/24</a:t>
             </a:fld>
             <a:endParaRPr lang="en-US"/>
           </a:p>
@@ -1657,7 +1658,7 @@
           <a:p>
             <a:fld id="{E0B89D21-97A6-4434-B3B1-BAF5738D61F3}" type="datetimeFigureOut">
               <a:rPr lang="en-US" smtClean="0"/>
-              <a:t>9/18/2024</a:t>
+              <a:t>9/18/24</a:t>
             </a:fld>
             <a:endParaRPr lang="en-US"/>
           </a:p>
@@ -1922,7 +1923,7 @@
           <a:p>
             <a:fld id="{E0B89D21-97A6-4434-B3B1-BAF5738D61F3}" type="datetimeFigureOut">
               <a:rPr lang="en-US" smtClean="0"/>
-              <a:t>9/18/2024</a:t>
+              <a:t>9/18/24</a:t>
             </a:fld>
             <a:endParaRPr lang="en-US"/>
           </a:p>
@@ -2334,7 +2335,7 @@
           <a:p>
             <a:fld id="{E0B89D21-97A6-4434-B3B1-BAF5738D61F3}" type="datetimeFigureOut">
               <a:rPr lang="en-US" smtClean="0"/>
-              <a:t>9/18/2024</a:t>
+              <a:t>9/18/24</a:t>
             </a:fld>
             <a:endParaRPr lang="en-US"/>
           </a:p>
@@ -2475,7 +2476,7 @@
           <a:p>
             <a:fld id="{E0B89D21-97A6-4434-B3B1-BAF5738D61F3}" type="datetimeFigureOut">
               <a:rPr lang="en-US" smtClean="0"/>
-              <a:t>9/18/2024</a:t>
+              <a:t>9/18/24</a:t>
             </a:fld>
             <a:endParaRPr lang="en-US"/>
           </a:p>
@@ -2588,7 +2589,7 @@
           <a:p>
             <a:fld id="{E0B89D21-97A6-4434-B3B1-BAF5738D61F3}" type="datetimeFigureOut">
               <a:rPr lang="en-US" smtClean="0"/>
-              <a:t>9/18/2024</a:t>
+              <a:t>9/18/24</a:t>
             </a:fld>
             <a:endParaRPr lang="en-US"/>
           </a:p>
@@ -2899,7 +2900,7 @@
           <a:p>
             <a:fld id="{E0B89D21-97A6-4434-B3B1-BAF5738D61F3}" type="datetimeFigureOut">
               <a:rPr lang="en-US" smtClean="0"/>
-              <a:t>9/18/2024</a:t>
+              <a:t>9/18/24</a:t>
             </a:fld>
             <a:endParaRPr lang="en-US"/>
           </a:p>
@@ -3187,7 +3188,7 @@
           <a:p>
             <a:fld id="{E0B89D21-97A6-4434-B3B1-BAF5738D61F3}" type="datetimeFigureOut">
               <a:rPr lang="en-US" smtClean="0"/>
-              <a:t>9/18/2024</a:t>
+              <a:t>9/18/24</a:t>
             </a:fld>
             <a:endParaRPr lang="en-US"/>
           </a:p>
@@ -3428,7 +3429,7 @@
           <a:p>
             <a:fld id="{E0B89D21-97A6-4434-B3B1-BAF5738D61F3}" type="datetimeFigureOut">
               <a:rPr lang="en-US" smtClean="0"/>
-              <a:t>9/18/2024</a:t>
+              <a:t>9/18/24</a:t>
             </a:fld>
             <a:endParaRPr lang="en-US"/>
           </a:p>
@@ -4216,6 +4217,159 @@
     <p:extLst>
       <p:ext uri="{BB962C8B-B14F-4D97-AF65-F5344CB8AC3E}">
         <p14:creationId xmlns:p14="http://schemas.microsoft.com/office/powerpoint/2010/main" val="637466271"/>
+      </p:ext>
+    </p:extLst>
+  </p:cSld>
+  <p:clrMapOvr>
+    <a:masterClrMapping/>
+  </p:clrMapOvr>
+</p:sld>
+</file>
+
+<file path=ppt/slides/slide5.xml><?xml version="1.0" encoding="utf-8"?>
+<p:sld xmlns:a="http://schemas.openxmlformats.org/drawingml/2006/main" xmlns:r="http://schemas.openxmlformats.org/officeDocument/2006/relationships" xmlns:p="http://schemas.openxmlformats.org/presentationml/2006/main">
+  <p:cSld>
+    <p:spTree>
+      <p:nvGrpSpPr>
+        <p:cNvPr id="1" name=""/>
+        <p:cNvGrpSpPr/>
+        <p:nvPr/>
+      </p:nvGrpSpPr>
+      <p:grpSpPr>
+        <a:xfrm>
+          <a:off x="0" y="0"/>
+          <a:ext cx="0" cy="0"/>
+          <a:chOff x="0" y="0"/>
+          <a:chExt cx="0" cy="0"/>
+        </a:xfrm>
+      </p:grpSpPr>
+      <p:sp>
+        <p:nvSpPr>
+          <p:cNvPr id="2" name="Title 1">
+            <a:extLst>
+              <a:ext uri="{FF2B5EF4-FFF2-40B4-BE49-F238E27FC236}">
+                <a16:creationId xmlns:a16="http://schemas.microsoft.com/office/drawing/2014/main" id="{D26F2126-3FD5-5E68-567B-A3C29613AC39}"/>
+              </a:ext>
+            </a:extLst>
+          </p:cNvPr>
+          <p:cNvSpPr>
+            <a:spLocks noGrp="1"/>
+          </p:cNvSpPr>
+          <p:nvPr>
+            <p:ph type="title"/>
+          </p:nvPr>
+        </p:nvSpPr>
+        <p:spPr/>
+        <p:txBody>
+          <a:bodyPr/>
+          <a:lstStyle/>
+          <a:p>
+            <a:r>
+              <a:rPr lang="es-ES_tradnl" dirty="0"/>
+              <a:t>Usando </a:t>
+            </a:r>
+            <a:r>
+              <a:rPr lang="es-ES_tradnl" dirty="0" err="1"/>
+              <a:t>Hooks</a:t>
+            </a:r>
+            <a:endParaRPr lang="es-ES_tradnl" dirty="0"/>
+          </a:p>
+        </p:txBody>
+      </p:sp>
+      <p:sp>
+        <p:nvSpPr>
+          <p:cNvPr id="3" name="Content Placeholder 2">
+            <a:extLst>
+              <a:ext uri="{FF2B5EF4-FFF2-40B4-BE49-F238E27FC236}">
+                <a16:creationId xmlns:a16="http://schemas.microsoft.com/office/drawing/2014/main" id="{B320F7D5-B5C3-D533-424A-F7CA08C4284C}"/>
+              </a:ext>
+            </a:extLst>
+          </p:cNvPr>
+          <p:cNvSpPr>
+            <a:spLocks noGrp="1"/>
+          </p:cNvSpPr>
+          <p:nvPr>
+            <p:ph idx="1"/>
+          </p:nvPr>
+        </p:nvSpPr>
+        <p:spPr/>
+        <p:txBody>
+          <a:bodyPr/>
+          <a:lstStyle/>
+          <a:p>
+            <a:r>
+              <a:rPr lang="es-ES_tradnl" dirty="0"/>
+              <a:t>Crear un nuevo URL “</a:t>
+            </a:r>
+            <a:r>
+              <a:rPr lang="es-ES_tradnl" dirty="0" err="1"/>
+              <a:t>users</a:t>
+            </a:r>
+            <a:r>
+              <a:rPr lang="es-ES_tradnl" dirty="0"/>
+              <a:t>/</a:t>
+            </a:r>
+            <a:r>
+              <a:rPr lang="es-ES_tradnl" dirty="0" err="1"/>
+              <a:t>form</a:t>
+            </a:r>
+            <a:r>
+              <a:rPr lang="es-ES_tradnl" dirty="0"/>
+              <a:t>/:</a:t>
+            </a:r>
+            <a:r>
+              <a:rPr lang="es-ES_tradnl"/>
+              <a:t>index?” </a:t>
+            </a:r>
+            <a:r>
+              <a:rPr lang="es-ES_tradnl" dirty="0"/>
+              <a:t>para una vista de formulario.</a:t>
+            </a:r>
+          </a:p>
+          <a:p>
+            <a:r>
+              <a:rPr lang="es-ES_tradnl" dirty="0"/>
+              <a:t>Crear un formulario para </a:t>
+            </a:r>
+            <a:r>
+              <a:rPr lang="es-ES_tradnl" dirty="0" err="1"/>
+              <a:t>name</a:t>
+            </a:r>
+            <a:r>
+              <a:rPr lang="es-ES_tradnl" dirty="0"/>
+              <a:t>, </a:t>
+            </a:r>
+            <a:r>
+              <a:rPr lang="es-ES_tradnl" dirty="0" err="1"/>
+              <a:t>age</a:t>
+            </a:r>
+            <a:r>
+              <a:rPr lang="es-ES_tradnl" dirty="0"/>
+              <a:t>, </a:t>
+            </a:r>
+            <a:r>
+              <a:rPr lang="es-ES_tradnl" dirty="0" err="1"/>
+              <a:t>city</a:t>
+            </a:r>
+            <a:r>
+              <a:rPr lang="es-ES_tradnl" dirty="0"/>
+              <a:t> y </a:t>
+            </a:r>
+            <a:r>
+              <a:rPr lang="es-ES_tradnl" dirty="0" err="1"/>
+              <a:t>verified</a:t>
+            </a:r>
+            <a:r>
+              <a:rPr lang="es-ES_tradnl" dirty="0"/>
+              <a:t>.</a:t>
+            </a:r>
+          </a:p>
+        </p:txBody>
+      </p:sp>
+    </p:spTree>
+    <p:extLst>
+      <p:ext uri="{BB962C8B-B14F-4D97-AF65-F5344CB8AC3E}">
+        <p14:creationId xmlns:p14="http://schemas.microsoft.com/office/powerpoint/2010/main" val="2414382881"/>
       </p:ext>
     </p:extLst>
   </p:cSld>
@@ -4856,15 +5010,6 @@
 </file>
 
 <file path=customXml/item1.xml><?xml version="1.0" encoding="utf-8"?>
-<?mso-contentType ?>
-<FormTemplates xmlns="http://schemas.microsoft.com/sharepoint/v3/contenttype/forms">
-  <Display>DocumentLibraryForm</Display>
-  <Edit>DocumentLibraryForm</Edit>
-  <New>DocumentLibraryForm</New>
-</FormTemplates>
-</file>
-
-<file path=customXml/item2.xml><?xml version="1.0" encoding="utf-8"?>
 <ct:contentTypeSchema xmlns:ct="http://schemas.microsoft.com/office/2006/metadata/contentType" xmlns:ma="http://schemas.microsoft.com/office/2006/metadata/properties/metaAttributes" ct:_="" ma:_="" ma:contentTypeName="Documento" ma:contentTypeID="0x0101000ABC46EDA268834388609BD5B286F917" ma:contentTypeVersion="17" ma:contentTypeDescription="Crear nuevo documento." ma:contentTypeScope="" ma:versionID="b8ef759d716670bba47381dcbb7cab08">
   <xsd:schema xmlns:xsd="http://www.w3.org/2001/XMLSchema" xmlns:xs="http://www.w3.org/2001/XMLSchema" xmlns:p="http://schemas.microsoft.com/office/2006/metadata/properties" xmlns:ns3="98b3f1ad-107c-497c-bb15-64aaebc89f52" xmlns:ns4="a0690ee9-4047-4223-84b2-6b02f926f5d8" targetNamespace="http://schemas.microsoft.com/office/2006/metadata/properties" ma:root="true" ma:fieldsID="f0548e293e02a81e2d97140f47270d75" ns3:_="" ns4:_="">
     <xsd:import namespace="98b3f1ad-107c-497c-bb15-64aaebc89f52"/>
@@ -5111,6 +5256,15 @@
 </ct:contentTypeSchema>
 </file>
 
+<file path=customXml/item2.xml><?xml version="1.0" encoding="utf-8"?>
+<?mso-contentType ?>
+<FormTemplates xmlns="http://schemas.microsoft.com/sharepoint/v3/contenttype/forms">
+  <Display>DocumentLibraryForm</Display>
+  <Edit>DocumentLibraryForm</Edit>
+  <New>DocumentLibraryForm</New>
+</FormTemplates>
+</file>
+
 <file path=customXml/item3.xml><?xml version="1.0" encoding="utf-8"?>
 <p:properties xmlns:p="http://schemas.microsoft.com/office/2006/metadata/properties" xmlns:xsi="http://www.w3.org/2001/XMLSchema-instance" xmlns:pc="http://schemas.microsoft.com/office/infopath/2007/PartnerControls">
   <documentManagement>
@@ -5120,14 +5274,6 @@
 </file>
 
 <file path=customXml/itemProps1.xml><?xml version="1.0" encoding="utf-8"?>
-<ds:datastoreItem xmlns:ds="http://schemas.openxmlformats.org/officeDocument/2006/customXml" ds:itemID="{F5C501D5-0101-419A-AFBB-D8F04111C142}">
-  <ds:schemaRefs>
-    <ds:schemaRef ds:uri="http://schemas.microsoft.com/sharepoint/v3/contenttype/forms"/>
-  </ds:schemaRefs>
-</ds:datastoreItem>
-</file>
-
-<file path=customXml/itemProps2.xml><?xml version="1.0" encoding="utf-8"?>
 <ds:datastoreItem xmlns:ds="http://schemas.openxmlformats.org/officeDocument/2006/customXml" ds:itemID="{3FCEF456-3233-44D6-BC5A-12E8FD4D2764}">
   <ds:schemaRefs>
     <ds:schemaRef ds:uri="http://schemas.microsoft.com/office/2006/metadata/contentType"/>
@@ -5142,6 +5288,14 @@
     <ds:schemaRef ds:uri="http://purl.org/dc/elements/1.1/"/>
     <ds:schemaRef ds:uri="http://purl.org/dc/terms/"/>
     <ds:schemaRef ds:uri="http://schemas.microsoft.com/internal/obd"/>
+  </ds:schemaRefs>
+</ds:datastoreItem>
+</file>
+
+<file path=customXml/itemProps2.xml><?xml version="1.0" encoding="utf-8"?>
+<ds:datastoreItem xmlns:ds="http://schemas.openxmlformats.org/officeDocument/2006/customXml" ds:itemID="{F5C501D5-0101-419A-AFBB-D8F04111C142}">
+  <ds:schemaRefs>
+    <ds:schemaRef ds:uri="http://schemas.microsoft.com/sharepoint/v3/contenttype/forms"/>
   </ds:schemaRefs>
 </ds:datastoreItem>
 </file>

</xml_diff>

<commit_message>
feat: init module 5
</commit_message>
<xml_diff>
--- a/Unidad_4/Presentación.pptx
+++ b/Unidad_4/Presentación.pptx
@@ -5,7 +5,7 @@
     <p:sldMasterId id="2147483648" r:id="rId4"/>
   </p:sldMasterIdLst>
   <p:notesMasterIdLst>
-    <p:notesMasterId r:id="rId10"/>
+    <p:notesMasterId r:id="rId11"/>
   </p:notesMasterIdLst>
   <p:sldIdLst>
     <p:sldId id="256" r:id="rId5"/>
@@ -13,6 +13,7 @@
     <p:sldId id="258" r:id="rId7"/>
     <p:sldId id="259" r:id="rId8"/>
     <p:sldId id="260" r:id="rId9"/>
+    <p:sldId id="261" r:id="rId10"/>
   </p:sldIdLst>
   <p:sldSz cx="12192000" cy="6858000"/>
   <p:notesSz cx="6858000" cy="9144000"/>
@@ -212,7 +213,7 @@
           <a:p>
             <a:fld id="{F29DC657-A5B9-41B4-AB57-79E3DB3481E8}" type="datetimeFigureOut">
               <a:rPr lang="en-US" smtClean="0"/>
-              <a:t>9/18/24</a:t>
+              <a:t>9/19/24</a:t>
             </a:fld>
             <a:endParaRPr lang="en-US"/>
           </a:p>
@@ -710,7 +711,7 @@
           <a:p>
             <a:fld id="{E0B89D21-97A6-4434-B3B1-BAF5738D61F3}" type="datetimeFigureOut">
               <a:rPr lang="en-US" smtClean="0"/>
-              <a:t>9/18/24</a:t>
+              <a:t>9/19/24</a:t>
             </a:fld>
             <a:endParaRPr lang="en-US"/>
           </a:p>
@@ -908,7 +909,7 @@
           <a:p>
             <a:fld id="{E0B89D21-97A6-4434-B3B1-BAF5738D61F3}" type="datetimeFigureOut">
               <a:rPr lang="en-US" smtClean="0"/>
-              <a:t>9/18/24</a:t>
+              <a:t>9/19/24</a:t>
             </a:fld>
             <a:endParaRPr lang="en-US"/>
           </a:p>
@@ -1116,7 +1117,7 @@
           <a:p>
             <a:fld id="{E0B89D21-97A6-4434-B3B1-BAF5738D61F3}" type="datetimeFigureOut">
               <a:rPr lang="en-US" smtClean="0"/>
-              <a:t>9/18/24</a:t>
+              <a:t>9/19/24</a:t>
             </a:fld>
             <a:endParaRPr lang="en-US"/>
           </a:p>
@@ -1383,7 +1384,7 @@
           <a:p>
             <a:fld id="{E0B89D21-97A6-4434-B3B1-BAF5738D61F3}" type="datetimeFigureOut">
               <a:rPr lang="en-US" smtClean="0"/>
-              <a:t>9/18/24</a:t>
+              <a:t>9/19/24</a:t>
             </a:fld>
             <a:endParaRPr lang="en-US"/>
           </a:p>
@@ -1658,7 +1659,7 @@
           <a:p>
             <a:fld id="{E0B89D21-97A6-4434-B3B1-BAF5738D61F3}" type="datetimeFigureOut">
               <a:rPr lang="en-US" smtClean="0"/>
-              <a:t>9/18/24</a:t>
+              <a:t>9/19/24</a:t>
             </a:fld>
             <a:endParaRPr lang="en-US"/>
           </a:p>
@@ -1923,7 +1924,7 @@
           <a:p>
             <a:fld id="{E0B89D21-97A6-4434-B3B1-BAF5738D61F3}" type="datetimeFigureOut">
               <a:rPr lang="en-US" smtClean="0"/>
-              <a:t>9/18/24</a:t>
+              <a:t>9/19/24</a:t>
             </a:fld>
             <a:endParaRPr lang="en-US"/>
           </a:p>
@@ -2335,7 +2336,7 @@
           <a:p>
             <a:fld id="{E0B89D21-97A6-4434-B3B1-BAF5738D61F3}" type="datetimeFigureOut">
               <a:rPr lang="en-US" smtClean="0"/>
-              <a:t>9/18/24</a:t>
+              <a:t>9/19/24</a:t>
             </a:fld>
             <a:endParaRPr lang="en-US"/>
           </a:p>
@@ -2476,7 +2477,7 @@
           <a:p>
             <a:fld id="{E0B89D21-97A6-4434-B3B1-BAF5738D61F3}" type="datetimeFigureOut">
               <a:rPr lang="en-US" smtClean="0"/>
-              <a:t>9/18/24</a:t>
+              <a:t>9/19/24</a:t>
             </a:fld>
             <a:endParaRPr lang="en-US"/>
           </a:p>
@@ -2589,7 +2590,7 @@
           <a:p>
             <a:fld id="{E0B89D21-97A6-4434-B3B1-BAF5738D61F3}" type="datetimeFigureOut">
               <a:rPr lang="en-US" smtClean="0"/>
-              <a:t>9/18/24</a:t>
+              <a:t>9/19/24</a:t>
             </a:fld>
             <a:endParaRPr lang="en-US"/>
           </a:p>
@@ -2900,7 +2901,7 @@
           <a:p>
             <a:fld id="{E0B89D21-97A6-4434-B3B1-BAF5738D61F3}" type="datetimeFigureOut">
               <a:rPr lang="en-US" smtClean="0"/>
-              <a:t>9/18/24</a:t>
+              <a:t>9/19/24</a:t>
             </a:fld>
             <a:endParaRPr lang="en-US"/>
           </a:p>
@@ -3188,7 +3189,7 @@
           <a:p>
             <a:fld id="{E0B89D21-97A6-4434-B3B1-BAF5738D61F3}" type="datetimeFigureOut">
               <a:rPr lang="en-US" smtClean="0"/>
-              <a:t>9/18/24</a:t>
+              <a:t>9/19/24</a:t>
             </a:fld>
             <a:endParaRPr lang="en-US"/>
           </a:p>
@@ -3429,7 +3430,7 @@
           <a:p>
             <a:fld id="{E0B89D21-97A6-4434-B3B1-BAF5738D61F3}" type="datetimeFigureOut">
               <a:rPr lang="en-US" smtClean="0"/>
-              <a:t>9/18/24</a:t>
+              <a:t>9/19/24</a:t>
             </a:fld>
             <a:endParaRPr lang="en-US"/>
           </a:p>
@@ -4370,6 +4371,133 @@
     <p:extLst>
       <p:ext uri="{BB962C8B-B14F-4D97-AF65-F5344CB8AC3E}">
         <p14:creationId xmlns:p14="http://schemas.microsoft.com/office/powerpoint/2010/main" val="2414382881"/>
+      </p:ext>
+    </p:extLst>
+  </p:cSld>
+  <p:clrMapOvr>
+    <a:masterClrMapping/>
+  </p:clrMapOvr>
+</p:sld>
+</file>
+
+<file path=ppt/slides/slide6.xml><?xml version="1.0" encoding="utf-8"?>
+<p:sld xmlns:a="http://schemas.openxmlformats.org/drawingml/2006/main" xmlns:r="http://schemas.openxmlformats.org/officeDocument/2006/relationships" xmlns:p="http://schemas.openxmlformats.org/presentationml/2006/main">
+  <p:cSld>
+    <p:spTree>
+      <p:nvGrpSpPr>
+        <p:cNvPr id="1" name=""/>
+        <p:cNvGrpSpPr/>
+        <p:nvPr/>
+      </p:nvGrpSpPr>
+      <p:grpSpPr>
+        <a:xfrm>
+          <a:off x="0" y="0"/>
+          <a:ext cx="0" cy="0"/>
+          <a:chOff x="0" y="0"/>
+          <a:chExt cx="0" cy="0"/>
+        </a:xfrm>
+      </p:grpSpPr>
+      <p:sp>
+        <p:nvSpPr>
+          <p:cNvPr id="2" name="Title 1">
+            <a:extLst>
+              <a:ext uri="{FF2B5EF4-FFF2-40B4-BE49-F238E27FC236}">
+                <a16:creationId xmlns:a16="http://schemas.microsoft.com/office/drawing/2014/main" id="{28B9AE6B-316A-D4DD-7AF2-35DEC011C93B}"/>
+              </a:ext>
+            </a:extLst>
+          </p:cNvPr>
+          <p:cNvSpPr>
+            <a:spLocks noGrp="1"/>
+          </p:cNvSpPr>
+          <p:nvPr>
+            <p:ph type="title"/>
+          </p:nvPr>
+        </p:nvSpPr>
+        <p:spPr/>
+        <p:txBody>
+          <a:bodyPr/>
+          <a:lstStyle/>
+          <a:p>
+            <a:r>
+              <a:rPr lang="es-ES_tradnl" dirty="0"/>
+              <a:t>Práctica</a:t>
+            </a:r>
+          </a:p>
+        </p:txBody>
+      </p:sp>
+      <p:sp>
+        <p:nvSpPr>
+          <p:cNvPr id="3" name="Content Placeholder 2">
+            <a:extLst>
+              <a:ext uri="{FF2B5EF4-FFF2-40B4-BE49-F238E27FC236}">
+                <a16:creationId xmlns:a16="http://schemas.microsoft.com/office/drawing/2014/main" id="{D78E4910-BF98-6609-8268-8E32F0E4C00D}"/>
+              </a:ext>
+            </a:extLst>
+          </p:cNvPr>
+          <p:cNvSpPr>
+            <a:spLocks noGrp="1"/>
+          </p:cNvSpPr>
+          <p:nvPr>
+            <p:ph idx="1"/>
+          </p:nvPr>
+        </p:nvSpPr>
+        <p:spPr/>
+        <p:txBody>
+          <a:bodyPr/>
+          <a:lstStyle/>
+          <a:p>
+            <a:pPr marL="0" indent="0">
+              <a:buNone/>
+            </a:pPr>
+            <a:r>
+              <a:rPr lang="es-ES_tradnl" dirty="0"/>
+              <a:t>Crear un botón en el componente “</a:t>
+            </a:r>
+            <a:r>
+              <a:rPr lang="es-ES_tradnl" dirty="0" err="1"/>
+              <a:t>UserProfile</a:t>
+            </a:r>
+            <a:r>
+              <a:rPr lang="es-ES_tradnl" dirty="0"/>
+              <a:t>” que se llame “Eliminar” de color rojo. Este deberá invocar una nueva función en nuestro </a:t>
+            </a:r>
+            <a:r>
+              <a:rPr lang="es-ES_tradnl" dirty="0" err="1"/>
+              <a:t>DataSource</a:t>
+            </a:r>
+            <a:r>
+              <a:rPr lang="es-ES_tradnl" dirty="0"/>
+              <a:t> “</a:t>
+            </a:r>
+            <a:r>
+              <a:rPr lang="es-ES_tradnl" dirty="0" err="1"/>
+              <a:t>deleteUser</a:t>
+            </a:r>
+            <a:r>
+              <a:rPr lang="es-ES_tradnl" dirty="0"/>
+              <a:t>” que recibe el </a:t>
+            </a:r>
+            <a:r>
+              <a:rPr lang="es-ES_tradnl" dirty="0" err="1"/>
+              <a:t>index</a:t>
+            </a:r>
+            <a:r>
+              <a:rPr lang="es-ES_tradnl" dirty="0"/>
+              <a:t> del usuario y lo elimina de la base de datos.</a:t>
+            </a:r>
+          </a:p>
+          <a:p>
+            <a:pPr marL="0" indent="0">
+              <a:buNone/>
+            </a:pPr>
+            <a:endParaRPr lang="es-ES_tradnl" dirty="0"/>
+          </a:p>
+        </p:txBody>
+      </p:sp>
+    </p:spTree>
+    <p:extLst>
+      <p:ext uri="{BB962C8B-B14F-4D97-AF65-F5344CB8AC3E}">
+        <p14:creationId xmlns:p14="http://schemas.microsoft.com/office/powerpoint/2010/main" val="940038753"/>
       </p:ext>
     </p:extLst>
   </p:cSld>
@@ -5010,6 +5138,15 @@
 </file>
 
 <file path=customXml/item1.xml><?xml version="1.0" encoding="utf-8"?>
+<?mso-contentType ?>
+<FormTemplates xmlns="http://schemas.microsoft.com/sharepoint/v3/contenttype/forms">
+  <Display>DocumentLibraryForm</Display>
+  <Edit>DocumentLibraryForm</Edit>
+  <New>DocumentLibraryForm</New>
+</FormTemplates>
+</file>
+
+<file path=customXml/item2.xml><?xml version="1.0" encoding="utf-8"?>
 <ct:contentTypeSchema xmlns:ct="http://schemas.microsoft.com/office/2006/metadata/contentType" xmlns:ma="http://schemas.microsoft.com/office/2006/metadata/properties/metaAttributes" ct:_="" ma:_="" ma:contentTypeName="Documento" ma:contentTypeID="0x0101000ABC46EDA268834388609BD5B286F917" ma:contentTypeVersion="17" ma:contentTypeDescription="Crear nuevo documento." ma:contentTypeScope="" ma:versionID="b8ef759d716670bba47381dcbb7cab08">
   <xsd:schema xmlns:xsd="http://www.w3.org/2001/XMLSchema" xmlns:xs="http://www.w3.org/2001/XMLSchema" xmlns:p="http://schemas.microsoft.com/office/2006/metadata/properties" xmlns:ns3="98b3f1ad-107c-497c-bb15-64aaebc89f52" xmlns:ns4="a0690ee9-4047-4223-84b2-6b02f926f5d8" targetNamespace="http://schemas.microsoft.com/office/2006/metadata/properties" ma:root="true" ma:fieldsID="f0548e293e02a81e2d97140f47270d75" ns3:_="" ns4:_="">
     <xsd:import namespace="98b3f1ad-107c-497c-bb15-64aaebc89f52"/>
@@ -5256,15 +5393,6 @@
 </ct:contentTypeSchema>
 </file>
 
-<file path=customXml/item2.xml><?xml version="1.0" encoding="utf-8"?>
-<?mso-contentType ?>
-<FormTemplates xmlns="http://schemas.microsoft.com/sharepoint/v3/contenttype/forms">
-  <Display>DocumentLibraryForm</Display>
-  <Edit>DocumentLibraryForm</Edit>
-  <New>DocumentLibraryForm</New>
-</FormTemplates>
-</file>
-
 <file path=customXml/item3.xml><?xml version="1.0" encoding="utf-8"?>
 <p:properties xmlns:p="http://schemas.microsoft.com/office/2006/metadata/properties" xmlns:xsi="http://www.w3.org/2001/XMLSchema-instance" xmlns:pc="http://schemas.microsoft.com/office/infopath/2007/PartnerControls">
   <documentManagement>
@@ -5274,6 +5402,14 @@
 </file>
 
 <file path=customXml/itemProps1.xml><?xml version="1.0" encoding="utf-8"?>
+<ds:datastoreItem xmlns:ds="http://schemas.openxmlformats.org/officeDocument/2006/customXml" ds:itemID="{F5C501D5-0101-419A-AFBB-D8F04111C142}">
+  <ds:schemaRefs>
+    <ds:schemaRef ds:uri="http://schemas.microsoft.com/sharepoint/v3/contenttype/forms"/>
+  </ds:schemaRefs>
+</ds:datastoreItem>
+</file>
+
+<file path=customXml/itemProps2.xml><?xml version="1.0" encoding="utf-8"?>
 <ds:datastoreItem xmlns:ds="http://schemas.openxmlformats.org/officeDocument/2006/customXml" ds:itemID="{3FCEF456-3233-44D6-BC5A-12E8FD4D2764}">
   <ds:schemaRefs>
     <ds:schemaRef ds:uri="http://schemas.microsoft.com/office/2006/metadata/contentType"/>
@@ -5288,14 +5424,6 @@
     <ds:schemaRef ds:uri="http://purl.org/dc/elements/1.1/"/>
     <ds:schemaRef ds:uri="http://purl.org/dc/terms/"/>
     <ds:schemaRef ds:uri="http://schemas.microsoft.com/internal/obd"/>
-  </ds:schemaRefs>
-</ds:datastoreItem>
-</file>
-
-<file path=customXml/itemProps2.xml><?xml version="1.0" encoding="utf-8"?>
-<ds:datastoreItem xmlns:ds="http://schemas.openxmlformats.org/officeDocument/2006/customXml" ds:itemID="{F5C501D5-0101-419A-AFBB-D8F04111C142}">
-  <ds:schemaRefs>
-    <ds:schemaRef ds:uri="http://schemas.microsoft.com/sharepoint/v3/contenttype/forms"/>
   </ds:schemaRefs>
 </ds:datastoreItem>
 </file>

</xml_diff>